<commit_message>
added everything nicely and tightly together
</commit_message>
<xml_diff>
--- a/PowerPoint/Directional filtering.pptx
+++ b/PowerPoint/Directional filtering.pptx
@@ -111,6 +111,11 @@
       </a:defRPr>
     </a:lvl9pPr>
   </p:defaultTextStyle>
+  <p:extLst>
+    <p:ext uri="{EFAFB233-063F-42B5-8137-9DF3F51BA10A}">
+      <p15:sldGuideLst xmlns:p15="http://schemas.microsoft.com/office/powerpoint/2012/main"/>
+    </p:ext>
+  </p:extLst>
 </p:presentation>
 </file>
 
@@ -261,7 +266,7 @@
           <a:p>
             <a:fld id="{70232F52-550D-4C71-B328-693937974533}" type="datetimeFigureOut">
               <a:rPr lang="en-US" smtClean="0"/>
-              <a:t>20-Jan-19</a:t>
+              <a:t>1/22/2019</a:t>
             </a:fld>
             <a:endParaRPr lang="en-US"/>
           </a:p>
@@ -459,7 +464,7 @@
           <a:p>
             <a:fld id="{70232F52-550D-4C71-B328-693937974533}" type="datetimeFigureOut">
               <a:rPr lang="en-US" smtClean="0"/>
-              <a:t>20-Jan-19</a:t>
+              <a:t>1/22/2019</a:t>
             </a:fld>
             <a:endParaRPr lang="en-US"/>
           </a:p>
@@ -667,7 +672,7 @@
           <a:p>
             <a:fld id="{70232F52-550D-4C71-B328-693937974533}" type="datetimeFigureOut">
               <a:rPr lang="en-US" smtClean="0"/>
-              <a:t>20-Jan-19</a:t>
+              <a:t>1/22/2019</a:t>
             </a:fld>
             <a:endParaRPr lang="en-US"/>
           </a:p>
@@ -865,7 +870,7 @@
           <a:p>
             <a:fld id="{70232F52-550D-4C71-B328-693937974533}" type="datetimeFigureOut">
               <a:rPr lang="en-US" smtClean="0"/>
-              <a:t>20-Jan-19</a:t>
+              <a:t>1/22/2019</a:t>
             </a:fld>
             <a:endParaRPr lang="en-US"/>
           </a:p>
@@ -1140,7 +1145,7 @@
           <a:p>
             <a:fld id="{70232F52-550D-4C71-B328-693937974533}" type="datetimeFigureOut">
               <a:rPr lang="en-US" smtClean="0"/>
-              <a:t>20-Jan-19</a:t>
+              <a:t>1/22/2019</a:t>
             </a:fld>
             <a:endParaRPr lang="en-US"/>
           </a:p>
@@ -1405,7 +1410,7 @@
           <a:p>
             <a:fld id="{70232F52-550D-4C71-B328-693937974533}" type="datetimeFigureOut">
               <a:rPr lang="en-US" smtClean="0"/>
-              <a:t>20-Jan-19</a:t>
+              <a:t>1/22/2019</a:t>
             </a:fld>
             <a:endParaRPr lang="en-US"/>
           </a:p>
@@ -1817,7 +1822,7 @@
           <a:p>
             <a:fld id="{70232F52-550D-4C71-B328-693937974533}" type="datetimeFigureOut">
               <a:rPr lang="en-US" smtClean="0"/>
-              <a:t>20-Jan-19</a:t>
+              <a:t>1/22/2019</a:t>
             </a:fld>
             <a:endParaRPr lang="en-US"/>
           </a:p>
@@ -1958,7 +1963,7 @@
           <a:p>
             <a:fld id="{70232F52-550D-4C71-B328-693937974533}" type="datetimeFigureOut">
               <a:rPr lang="en-US" smtClean="0"/>
-              <a:t>20-Jan-19</a:t>
+              <a:t>1/22/2019</a:t>
             </a:fld>
             <a:endParaRPr lang="en-US"/>
           </a:p>
@@ -2071,7 +2076,7 @@
           <a:p>
             <a:fld id="{70232F52-550D-4C71-B328-693937974533}" type="datetimeFigureOut">
               <a:rPr lang="en-US" smtClean="0"/>
-              <a:t>20-Jan-19</a:t>
+              <a:t>1/22/2019</a:t>
             </a:fld>
             <a:endParaRPr lang="en-US"/>
           </a:p>
@@ -2382,7 +2387,7 @@
           <a:p>
             <a:fld id="{70232F52-550D-4C71-B328-693937974533}" type="datetimeFigureOut">
               <a:rPr lang="en-US" smtClean="0"/>
-              <a:t>20-Jan-19</a:t>
+              <a:t>1/22/2019</a:t>
             </a:fld>
             <a:endParaRPr lang="en-US"/>
           </a:p>
@@ -2670,7 +2675,7 @@
           <a:p>
             <a:fld id="{70232F52-550D-4C71-B328-693937974533}" type="datetimeFigureOut">
               <a:rPr lang="en-US" smtClean="0"/>
-              <a:t>20-Jan-19</a:t>
+              <a:t>1/22/2019</a:t>
             </a:fld>
             <a:endParaRPr lang="en-US"/>
           </a:p>
@@ -2911,7 +2916,7 @@
           <a:p>
             <a:fld id="{70232F52-550D-4C71-B328-693937974533}" type="datetimeFigureOut">
               <a:rPr lang="en-US" smtClean="0"/>
-              <a:t>20-Jan-19</a:t>
+              <a:t>1/22/2019</a:t>
             </a:fld>
             <a:endParaRPr lang="en-US"/>
           </a:p>
@@ -3503,7 +3508,7 @@
           <a:p>
             <a:pPr algn="ctr"/>
             <a:r>
-              <a:rPr lang="en-US" sz="2600" kern="1200">
+              <a:rPr lang="en-US" sz="2600" kern="1200" dirty="0">
                 <a:solidFill>
                   <a:srgbClr val="FFFFFF"/>
                 </a:solidFill>
@@ -3759,7 +3764,7 @@
           <a:p>
             <a:pPr algn="ctr"/>
             <a:r>
-              <a:rPr lang="en-US" sz="2600" kern="1200">
+              <a:rPr lang="en-US" sz="2600" kern="1200" dirty="0">
                 <a:solidFill>
                   <a:srgbClr val="FFFFFF"/>
                 </a:solidFill>
@@ -4015,7 +4020,7 @@
           <a:p>
             <a:pPr algn="ctr"/>
             <a:r>
-              <a:rPr lang="en-US" sz="2600" kern="1200">
+              <a:rPr lang="en-US" sz="2600" kern="1200" dirty="0">
                 <a:solidFill>
                   <a:srgbClr val="FFFFFF"/>
                 </a:solidFill>
@@ -4064,8 +4069,8 @@
           </a:prstGeom>
         </p:spPr>
       </p:pic>
-      <mc:AlternateContent xmlns:mc="http://schemas.openxmlformats.org/markup-compatibility/2006">
-        <mc:Choice xmlns:a14="http://schemas.microsoft.com/office/drawing/2010/main" Requires="a14">
+      <mc:AlternateContent xmlns:mc="http://schemas.openxmlformats.org/markup-compatibility/2006" xmlns:a14="http://schemas.microsoft.com/office/drawing/2010/main">
+        <mc:Choice Requires="a14">
           <p:sp>
             <p:nvSpPr>
               <p:cNvPr id="10" name="TextBox 9">
@@ -4094,6 +4099,7 @@
               </a:bodyPr>
               <a:lstStyle/>
               <a:p>
+                <a:pPr/>
                 <a14:m>
                   <m:oMathPara xmlns:m="http://schemas.openxmlformats.org/officeDocument/2006/math">
                     <m:oMathParaPr>
@@ -4340,6 +4346,7 @@
                 <a:endParaRPr lang="en-US" dirty="0"/>
               </a:p>
               <a:p>
+                <a:pPr/>
                 <a14:m>
                   <m:oMathPara xmlns:m="http://schemas.openxmlformats.org/officeDocument/2006/math">
                     <m:oMathParaPr>
@@ -4457,7 +4464,7 @@
             </p:txBody>
           </p:sp>
         </mc:Choice>
-        <mc:Fallback>
+        <mc:Fallback xmlns="">
           <p:sp>
             <p:nvSpPr>
               <p:cNvPr id="10" name="TextBox 9">

</xml_diff>